<commit_message>
Update PSA Policy Violation RCoon.pptx
</commit_message>
<xml_diff>
--- a/UNV 507/Topic 1/PSA Policy Violation RCoon.pptx
+++ b/UNV 507/Topic 1/PSA Policy Violation RCoon.pptx
@@ -5,7 +5,7 @@
     <p:sldMasterId id="2147483677" r:id="rId1"/>
   </p:sldMasterIdLst>
   <p:notesMasterIdLst>
-    <p:notesMasterId r:id="rId10"/>
+    <p:notesMasterId r:id="rId11"/>
   </p:notesMasterIdLst>
   <p:sldIdLst>
     <p:sldId id="256" r:id="rId2"/>
@@ -16,26 +16,39 @@
     <p:sldId id="269" r:id="rId7"/>
     <p:sldId id="270" r:id="rId8"/>
     <p:sldId id="266" r:id="rId9"/>
+    <p:sldId id="271" r:id="rId10"/>
   </p:sldIdLst>
   <p:sldSz cx="9144000" cy="5143500" type="screen16x9"/>
   <p:notesSz cx="6858000" cy="9144000"/>
   <p:embeddedFontLst>
     <p:embeddedFont>
       <p:font typeface="Anek Devanagari" panose="020B0604020202020204" charset="0"/>
-      <p:regular r:id="rId11"/>
-      <p:bold r:id="rId12"/>
+      <p:regular r:id="rId12"/>
+      <p:bold r:id="rId13"/>
     </p:embeddedFont>
     <p:embeddedFont>
       <p:font typeface="Anek Devanagari SemiBold" panose="020B0604020202020204" charset="0"/>
-      <p:regular r:id="rId13"/>
-      <p:bold r:id="rId14"/>
+      <p:regular r:id="rId14"/>
+      <p:bold r:id="rId15"/>
     </p:embeddedFont>
     <p:embeddedFont>
       <p:font typeface="Mulish" panose="020B0604020202020204" charset="0"/>
-      <p:regular r:id="rId15"/>
-      <p:bold r:id="rId16"/>
-      <p:italic r:id="rId17"/>
-      <p:boldItalic r:id="rId18"/>
+      <p:regular r:id="rId16"/>
+      <p:bold r:id="rId17"/>
+      <p:italic r:id="rId18"/>
+      <p:boldItalic r:id="rId19"/>
+    </p:embeddedFont>
+    <p:embeddedFont>
+      <p:font typeface="Open Sans" panose="020B0606030504020204" pitchFamily="34" charset="0"/>
+      <p:regular r:id="rId20"/>
+      <p:bold r:id="rId21"/>
+      <p:italic r:id="rId22"/>
+      <p:boldItalic r:id="rId23"/>
+    </p:embeddedFont>
+    <p:embeddedFont>
+      <p:font typeface="Roboto Condensed Light" panose="02000000000000000000" pitchFamily="2" charset="0"/>
+      <p:regular r:id="rId24"/>
+      <p:italic r:id="rId25"/>
     </p:embeddedFont>
   </p:embeddedFontLst>
   <p:defaultTextStyle>
@@ -267,6 +280,11 @@
       </a:defRPr>
     </a:lvl9pPr>
   </p:defaultTextStyle>
+  <p:extLst>
+    <p:ext uri="{EFAFB233-063F-42B5-8137-9DF3F51BA10A}">
+      <p15:sldGuideLst xmlns:p15="http://schemas.microsoft.com/office/powerpoint/2012/main"/>
+    </p:ext>
+  </p:extLst>
 </p:presentation>
 </file>
 
@@ -1556,6 +1574,115 @@
         </p:txBody>
       </p:sp>
     </p:spTree>
+  </p:cSld>
+  <p:clrMapOvr>
+    <a:masterClrMapping/>
+  </p:clrMapOvr>
+</p:notes>
+</file>
+
+<file path=ppt/notesSlides/notesSlide9.xml><?xml version="1.0" encoding="utf-8"?>
+<p:notes xmlns:a="http://schemas.openxmlformats.org/drawingml/2006/main" xmlns:r="http://schemas.openxmlformats.org/officeDocument/2006/relationships" xmlns:p="http://schemas.openxmlformats.org/presentationml/2006/main" showMasterSp="0" showMasterPhAnim="0">
+  <p:cSld>
+    <p:spTree>
+      <p:nvGrpSpPr>
+        <p:cNvPr id="1" name="Shape 414"/>
+        <p:cNvGrpSpPr/>
+        <p:nvPr/>
+      </p:nvGrpSpPr>
+      <p:grpSpPr>
+        <a:xfrm>
+          <a:off x="0" y="0"/>
+          <a:ext cx="0" cy="0"/>
+          <a:chOff x="0" y="0"/>
+          <a:chExt cx="0" cy="0"/>
+        </a:xfrm>
+      </p:grpSpPr>
+      <p:sp>
+        <p:nvSpPr>
+          <p:cNvPr id="415" name="Google Shape;415;g13b525e5fd1_0_81:notes"/>
+          <p:cNvSpPr>
+            <a:spLocks noGrp="1" noRot="1" noChangeAspect="1"/>
+          </p:cNvSpPr>
+          <p:nvPr>
+            <p:ph type="sldImg" idx="2"/>
+          </p:nvPr>
+        </p:nvSpPr>
+        <p:spPr>
+          <a:xfrm>
+            <a:off x="381000" y="685800"/>
+            <a:ext cx="6096000" cy="3429000"/>
+          </a:xfrm>
+          <a:custGeom>
+            <a:avLst/>
+            <a:gdLst/>
+            <a:ahLst/>
+            <a:cxnLst/>
+            <a:rect l="l" t="t" r="r" b="b"/>
+            <a:pathLst>
+              <a:path w="120000" h="120000" extrusionOk="0">
+                <a:moveTo>
+                  <a:pt x="0" y="0"/>
+                </a:moveTo>
+                <a:lnTo>
+                  <a:pt x="120000" y="0"/>
+                </a:lnTo>
+                <a:lnTo>
+                  <a:pt x="120000" y="120000"/>
+                </a:lnTo>
+                <a:lnTo>
+                  <a:pt x="0" y="120000"/>
+                </a:lnTo>
+                <a:close/>
+              </a:path>
+            </a:pathLst>
+          </a:custGeom>
+        </p:spPr>
+      </p:sp>
+      <p:sp>
+        <p:nvSpPr>
+          <p:cNvPr id="416" name="Google Shape;416;g13b525e5fd1_0_81:notes"/>
+          <p:cNvSpPr txBox="1">
+            <a:spLocks noGrp="1"/>
+          </p:cNvSpPr>
+          <p:nvPr>
+            <p:ph type="body" idx="1"/>
+          </p:nvPr>
+        </p:nvSpPr>
+        <p:spPr>
+          <a:xfrm>
+            <a:off x="685800" y="4343400"/>
+            <a:ext cx="5486400" cy="4114800"/>
+          </a:xfrm>
+          <a:prstGeom prst="rect">
+            <a:avLst/>
+          </a:prstGeom>
+        </p:spPr>
+        <p:txBody>
+          <a:bodyPr spcFirstLastPara="1" wrap="square" lIns="91425" tIns="91425" rIns="91425" bIns="91425" anchor="t" anchorCtr="0">
+            <a:noAutofit/>
+          </a:bodyPr>
+          <a:lstStyle/>
+          <a:p>
+            <a:pPr marL="0" lvl="0" indent="0" algn="l" rtl="0">
+              <a:spcBef>
+                <a:spcPts val="0"/>
+              </a:spcBef>
+              <a:spcAft>
+                <a:spcPts val="0"/>
+              </a:spcAft>
+              <a:buNone/>
+            </a:pPr>
+            <a:endParaRPr/>
+          </a:p>
+        </p:txBody>
+      </p:sp>
+    </p:spTree>
+    <p:extLst>
+      <p:ext uri="{BB962C8B-B14F-4D97-AF65-F5344CB8AC3E}">
+        <p14:creationId xmlns:p14="http://schemas.microsoft.com/office/powerpoint/2010/main" val="3217518851"/>
+      </p:ext>
+    </p:extLst>
   </p:cSld>
   <p:clrMapOvr>
     <a:masterClrMapping/>
@@ -7731,7 +7858,7 @@
         </p:nvSpPr>
         <p:spPr>
           <a:xfrm>
-            <a:off x="6040582" y="1123842"/>
+            <a:off x="5369374" y="856087"/>
             <a:ext cx="640200" cy="640200"/>
           </a:xfrm>
           <a:prstGeom prst="ellipse">
@@ -7777,7 +7904,7 @@
         </p:nvSpPr>
         <p:spPr>
           <a:xfrm>
-            <a:off x="6040582" y="2970945"/>
+            <a:off x="5359400" y="2449445"/>
             <a:ext cx="640200" cy="640200"/>
           </a:xfrm>
           <a:prstGeom prst="ellipse">
@@ -7823,7 +7950,7 @@
         </p:nvSpPr>
         <p:spPr>
           <a:xfrm>
-            <a:off x="2458268" y="2970945"/>
+            <a:off x="551647" y="2413212"/>
             <a:ext cx="640200" cy="640200"/>
           </a:xfrm>
           <a:prstGeom prst="ellipse">
@@ -7869,7 +7996,7 @@
         </p:nvSpPr>
         <p:spPr>
           <a:xfrm>
-            <a:off x="2458268" y="1123842"/>
+            <a:off x="551647" y="872442"/>
             <a:ext cx="640200" cy="640200"/>
           </a:xfrm>
           <a:prstGeom prst="ellipse">
@@ -7951,48 +8078,6 @@
       </p:sp>
       <p:sp>
         <p:nvSpPr>
-          <p:cNvPr id="263" name="Google Shape;263;p34"/>
-          <p:cNvSpPr txBox="1">
-            <a:spLocks noGrp="1"/>
-          </p:cNvSpPr>
-          <p:nvPr>
-            <p:ph type="subTitle" idx="3"/>
-          </p:nvPr>
-        </p:nvSpPr>
-        <p:spPr>
-          <a:xfrm flipH="1">
-            <a:off x="4925932" y="2208640"/>
-            <a:ext cx="2869500" cy="548700"/>
-          </a:xfrm>
-          <a:prstGeom prst="rect">
-            <a:avLst/>
-          </a:prstGeom>
-        </p:spPr>
-        <p:txBody>
-          <a:bodyPr spcFirstLastPara="1" wrap="square" lIns="91425" tIns="91425" rIns="91425" bIns="91425" anchor="t" anchorCtr="0">
-            <a:noAutofit/>
-          </a:bodyPr>
-          <a:lstStyle/>
-          <a:p>
-            <a:pPr marL="0" lvl="0" indent="0" algn="ctr" rtl="0">
-              <a:spcBef>
-                <a:spcPts val="0"/>
-              </a:spcBef>
-              <a:spcAft>
-                <a:spcPts val="0"/>
-              </a:spcAft>
-              <a:buNone/>
-            </a:pPr>
-            <a:r>
-              <a:rPr lang="en"/>
-              <a:t>You can describe the topic of the section here</a:t>
-            </a:r>
-            <a:endParaRPr/>
-          </a:p>
-        </p:txBody>
-      </p:sp>
-      <p:sp>
-        <p:nvSpPr>
           <p:cNvPr id="264" name="Google Shape;264;p34"/>
           <p:cNvSpPr txBox="1">
             <a:spLocks noGrp="1"/>
@@ -8003,7 +8088,7 @@
         </p:nvSpPr>
         <p:spPr>
           <a:xfrm>
-            <a:off x="1348568" y="1918708"/>
+            <a:off x="1469998" y="1123574"/>
             <a:ext cx="2859600" cy="365700"/>
           </a:xfrm>
           <a:prstGeom prst="rect">
@@ -8026,52 +8111,10 @@
               <a:buNone/>
             </a:pPr>
             <a:r>
-              <a:rPr lang="en"/>
-              <a:t>About the company</a:t>
+              <a:rPr lang="en" dirty="0"/>
+              <a:t>Academic Integrity</a:t>
             </a:r>
-            <a:endParaRPr/>
-          </a:p>
-        </p:txBody>
-      </p:sp>
-      <p:sp>
-        <p:nvSpPr>
-          <p:cNvPr id="265" name="Google Shape;265;p34"/>
-          <p:cNvSpPr txBox="1">
-            <a:spLocks noGrp="1"/>
-          </p:cNvSpPr>
-          <p:nvPr>
-            <p:ph type="subTitle" idx="1"/>
-          </p:nvPr>
-        </p:nvSpPr>
-        <p:spPr>
-          <a:xfrm>
-            <a:off x="1348568" y="2208643"/>
-            <a:ext cx="2859600" cy="548700"/>
-          </a:xfrm>
-          <a:prstGeom prst="rect">
-            <a:avLst/>
-          </a:prstGeom>
-        </p:spPr>
-        <p:txBody>
-          <a:bodyPr spcFirstLastPara="1" wrap="square" lIns="91425" tIns="91425" rIns="91425" bIns="91425" anchor="t" anchorCtr="0">
-            <a:noAutofit/>
-          </a:bodyPr>
-          <a:lstStyle/>
-          <a:p>
-            <a:pPr marL="0" lvl="0" indent="0" algn="ctr" rtl="0">
-              <a:spcBef>
-                <a:spcPts val="0"/>
-              </a:spcBef>
-              <a:spcAft>
-                <a:spcPts val="0"/>
-              </a:spcAft>
-              <a:buNone/>
-            </a:pPr>
-            <a:r>
-              <a:rPr lang="en"/>
-              <a:t>You can describe the topic of the section here</a:t>
-            </a:r>
-            <a:endParaRPr/>
+            <a:endParaRPr dirty="0"/>
           </a:p>
         </p:txBody>
       </p:sp>
@@ -8087,7 +8130,7 @@
         </p:nvSpPr>
         <p:spPr>
           <a:xfrm flipH="1">
-            <a:off x="4925782" y="1918700"/>
+            <a:off x="6094100" y="1739171"/>
             <a:ext cx="2869800" cy="365700"/>
           </a:xfrm>
           <a:prstGeom prst="rect">
@@ -8110,10 +8153,10 @@
               <a:buNone/>
             </a:pPr>
             <a:r>
-              <a:rPr lang="en"/>
-              <a:t>Our services</a:t>
+              <a:rPr lang="en" dirty="0"/>
+              <a:t>Graduate level academic research requirements</a:t>
             </a:r>
-            <a:endParaRPr/>
+            <a:endParaRPr dirty="0"/>
           </a:p>
         </p:txBody>
       </p:sp>
@@ -8129,7 +8172,7 @@
         </p:nvSpPr>
         <p:spPr>
           <a:xfrm>
-            <a:off x="1348568" y="3759552"/>
+            <a:off x="1317110" y="2645778"/>
             <a:ext cx="2859600" cy="365700"/>
           </a:xfrm>
           <a:prstGeom prst="rect">
@@ -8152,52 +8195,10 @@
               <a:buNone/>
             </a:pPr>
             <a:r>
-              <a:rPr lang="en"/>
-              <a:t>Our clients</a:t>
+              <a:rPr lang="en" dirty="0"/>
+              <a:t>Role of faith integration</a:t>
             </a:r>
-            <a:endParaRPr/>
-          </a:p>
-        </p:txBody>
-      </p:sp>
-      <p:sp>
-        <p:nvSpPr>
-          <p:cNvPr id="268" name="Google Shape;268;p34"/>
-          <p:cNvSpPr txBox="1">
-            <a:spLocks noGrp="1"/>
-          </p:cNvSpPr>
-          <p:nvPr>
-            <p:ph type="subTitle" idx="8"/>
-          </p:nvPr>
-        </p:nvSpPr>
-        <p:spPr>
-          <a:xfrm>
-            <a:off x="1348418" y="4050725"/>
-            <a:ext cx="2859900" cy="548700"/>
-          </a:xfrm>
-          <a:prstGeom prst="rect">
-            <a:avLst/>
-          </a:prstGeom>
-        </p:spPr>
-        <p:txBody>
-          <a:bodyPr spcFirstLastPara="1" wrap="square" lIns="91425" tIns="91425" rIns="91425" bIns="91425" anchor="t" anchorCtr="0">
-            <a:noAutofit/>
-          </a:bodyPr>
-          <a:lstStyle/>
-          <a:p>
-            <a:pPr marL="0" lvl="0" indent="0" algn="ctr" rtl="0">
-              <a:spcBef>
-                <a:spcPts val="0"/>
-              </a:spcBef>
-              <a:spcAft>
-                <a:spcPts val="0"/>
-              </a:spcAft>
-              <a:buNone/>
-            </a:pPr>
-            <a:r>
-              <a:rPr lang="en"/>
-              <a:t>You can describe the topic of the section here</a:t>
-            </a:r>
-            <a:endParaRPr/>
+            <a:endParaRPr dirty="0"/>
           </a:p>
         </p:txBody>
       </p:sp>
@@ -8213,7 +8214,7 @@
         </p:nvSpPr>
         <p:spPr>
           <a:xfrm flipH="1">
-            <a:off x="4925782" y="3759548"/>
+            <a:off x="6094100" y="2708850"/>
             <a:ext cx="2869800" cy="365700"/>
           </a:xfrm>
           <a:prstGeom prst="rect">
@@ -8236,52 +8237,14 @@
               <a:buNone/>
             </a:pPr>
             <a:r>
-              <a:rPr lang="en"/>
-              <a:t>Expected projection</a:t>
+              <a:rPr lang="en-US" dirty="0"/>
+              <a:t>A</a:t>
             </a:r>
-            <a:endParaRPr/>
-          </a:p>
-        </p:txBody>
-      </p:sp>
-      <p:sp>
-        <p:nvSpPr>
-          <p:cNvPr id="270" name="Google Shape;270;p34"/>
-          <p:cNvSpPr txBox="1">
-            <a:spLocks noGrp="1"/>
-          </p:cNvSpPr>
-          <p:nvPr>
-            <p:ph type="subTitle" idx="13"/>
-          </p:nvPr>
-        </p:nvSpPr>
-        <p:spPr>
-          <a:xfrm flipH="1">
-            <a:off x="4925932" y="4050724"/>
-            <a:ext cx="2869500" cy="548700"/>
-          </a:xfrm>
-          <a:prstGeom prst="rect">
-            <a:avLst/>
-          </a:prstGeom>
-        </p:spPr>
-        <p:txBody>
-          <a:bodyPr spcFirstLastPara="1" wrap="square" lIns="91425" tIns="91425" rIns="91425" bIns="91425" anchor="t" anchorCtr="0">
-            <a:noAutofit/>
-          </a:bodyPr>
-          <a:lstStyle/>
-          <a:p>
-            <a:pPr marL="0" lvl="0" indent="0" algn="ctr" rtl="0">
-              <a:spcBef>
-                <a:spcPts val="0"/>
-              </a:spcBef>
-              <a:spcAft>
-                <a:spcPts val="0"/>
-              </a:spcAft>
-              <a:buNone/>
-            </a:pPr>
             <a:r>
-              <a:rPr lang="en"/>
-              <a:t>You can describe the topic of the section here</a:t>
+              <a:rPr lang="en" dirty="0"/>
+              <a:t>cademic dishonesty</a:t>
             </a:r>
-            <a:endParaRPr/>
+            <a:endParaRPr dirty="0"/>
           </a:p>
         </p:txBody>
       </p:sp>
@@ -8297,7 +8260,7 @@
         </p:nvSpPr>
         <p:spPr>
           <a:xfrm>
-            <a:off x="2411018" y="1192542"/>
+            <a:off x="504397" y="1015610"/>
             <a:ext cx="734700" cy="502800"/>
           </a:xfrm>
           <a:prstGeom prst="rect">
@@ -8320,10 +8283,10 @@
               <a:buNone/>
             </a:pPr>
             <a:r>
-              <a:rPr lang="en"/>
-              <a:t>01</a:t>
+              <a:rPr lang="en" dirty="0"/>
+              <a:t>1</a:t>
             </a:r>
-            <a:endParaRPr/>
+            <a:endParaRPr dirty="0"/>
           </a:p>
         </p:txBody>
       </p:sp>
@@ -8339,7 +8302,7 @@
         </p:nvSpPr>
         <p:spPr>
           <a:xfrm>
-            <a:off x="2411018" y="3039645"/>
+            <a:off x="504397" y="2571750"/>
             <a:ext cx="734700" cy="502800"/>
           </a:xfrm>
           <a:prstGeom prst="rect">
@@ -8362,10 +8325,10 @@
               <a:buNone/>
             </a:pPr>
             <a:r>
-              <a:rPr lang="en"/>
-              <a:t>03</a:t>
+              <a:rPr lang="en" dirty="0"/>
+              <a:t>3</a:t>
             </a:r>
-            <a:endParaRPr/>
+            <a:endParaRPr dirty="0"/>
           </a:p>
         </p:txBody>
       </p:sp>
@@ -8381,7 +8344,7 @@
         </p:nvSpPr>
         <p:spPr>
           <a:xfrm flipH="1">
-            <a:off x="5993332" y="1192542"/>
+            <a:off x="5322124" y="1039087"/>
             <a:ext cx="734700" cy="502800"/>
           </a:xfrm>
           <a:prstGeom prst="rect">
@@ -8404,10 +8367,10 @@
               <a:buNone/>
             </a:pPr>
             <a:r>
-              <a:rPr lang="en"/>
-              <a:t>02</a:t>
+              <a:rPr lang="en" dirty="0"/>
+              <a:t>2</a:t>
             </a:r>
-            <a:endParaRPr/>
+            <a:endParaRPr dirty="0"/>
           </a:p>
         </p:txBody>
       </p:sp>
@@ -8423,7 +8386,7 @@
         </p:nvSpPr>
         <p:spPr>
           <a:xfrm flipH="1">
-            <a:off x="5993332" y="3039645"/>
+            <a:off x="5296366" y="2613012"/>
             <a:ext cx="734700" cy="502800"/>
           </a:xfrm>
           <a:prstGeom prst="rect">
@@ -8446,10 +8409,634 @@
               <a:buNone/>
             </a:pPr>
             <a:r>
-              <a:rPr lang="en"/>
-              <a:t>04</a:t>
+              <a:rPr lang="en" dirty="0"/>
+              <a:t>4</a:t>
             </a:r>
-            <a:endParaRPr/>
+            <a:endParaRPr dirty="0"/>
+          </a:p>
+        </p:txBody>
+      </p:sp>
+      <p:sp>
+        <p:nvSpPr>
+          <p:cNvPr id="10" name="Google Shape;259;p34">
+            <a:extLst>
+              <a:ext uri="{FF2B5EF4-FFF2-40B4-BE49-F238E27FC236}">
+                <a16:creationId xmlns:a16="http://schemas.microsoft.com/office/drawing/2014/main" id="{D5710362-D1BF-A9BF-7702-B243CCDC0CB3}"/>
+              </a:ext>
+            </a:extLst>
+          </p:cNvPr>
+          <p:cNvSpPr/>
+          <p:nvPr/>
+        </p:nvSpPr>
+        <p:spPr>
+          <a:xfrm>
+            <a:off x="3647881" y="3699826"/>
+            <a:ext cx="640200" cy="640200"/>
+          </a:xfrm>
+          <a:prstGeom prst="ellipse">
+            <a:avLst/>
+          </a:prstGeom>
+          <a:solidFill>
+            <a:srgbClr val="FFFFFF">
+              <a:alpha val="36080"/>
+            </a:srgbClr>
+          </a:solidFill>
+          <a:ln>
+            <a:noFill/>
+          </a:ln>
+        </p:spPr>
+        <p:txBody>
+          <a:bodyPr spcFirstLastPara="1" wrap="square" lIns="91425" tIns="91425" rIns="91425" bIns="91425" anchor="ctr" anchorCtr="0">
+            <a:noAutofit/>
+          </a:bodyPr>
+          <a:lstStyle/>
+          <a:p>
+            <a:pPr marL="0" lvl="0" indent="0" algn="l" rtl="0">
+              <a:spcBef>
+                <a:spcPts val="0"/>
+              </a:spcBef>
+              <a:spcAft>
+                <a:spcPts val="0"/>
+              </a:spcAft>
+              <a:buNone/>
+            </a:pPr>
+            <a:endParaRPr>
+              <a:solidFill>
+                <a:schemeClr val="lt1"/>
+              </a:solidFill>
+            </a:endParaRPr>
+          </a:p>
+        </p:txBody>
+      </p:sp>
+      <p:sp>
+        <p:nvSpPr>
+          <p:cNvPr id="11" name="Google Shape;274;p34">
+            <a:extLst>
+              <a:ext uri="{FF2B5EF4-FFF2-40B4-BE49-F238E27FC236}">
+                <a16:creationId xmlns:a16="http://schemas.microsoft.com/office/drawing/2014/main" id="{9D20D8DA-72B1-FEC1-A753-A5C0F034EB54}"/>
+              </a:ext>
+            </a:extLst>
+          </p:cNvPr>
+          <p:cNvSpPr txBox="1">
+            <a:spLocks/>
+          </p:cNvSpPr>
+          <p:nvPr/>
+        </p:nvSpPr>
+        <p:spPr>
+          <a:xfrm flipH="1">
+            <a:off x="3594898" y="3889521"/>
+            <a:ext cx="734700" cy="502800"/>
+          </a:xfrm>
+          <a:prstGeom prst="rect">
+            <a:avLst/>
+          </a:prstGeom>
+          <a:noFill/>
+          <a:ln>
+            <a:noFill/>
+          </a:ln>
+        </p:spPr>
+        <p:txBody>
+          <a:bodyPr spcFirstLastPara="1" wrap="square" lIns="91425" tIns="91425" rIns="91425" bIns="91425" anchor="b" anchorCtr="0">
+            <a:noAutofit/>
+          </a:bodyPr>
+          <a:lstStyle>
+            <a:defPPr marR="0" lvl="0" algn="l" rtl="0">
+              <a:lnSpc>
+                <a:spcPct val="100000"/>
+              </a:lnSpc>
+              <a:spcBef>
+                <a:spcPts val="0"/>
+              </a:spcBef>
+              <a:spcAft>
+                <a:spcPts val="0"/>
+              </a:spcAft>
+            </a:defPPr>
+            <a:lvl1pPr marR="0" lvl="0" algn="ctr" rtl="0">
+              <a:lnSpc>
+                <a:spcPct val="100000"/>
+              </a:lnSpc>
+              <a:spcBef>
+                <a:spcPts val="0"/>
+              </a:spcBef>
+              <a:spcAft>
+                <a:spcPts val="0"/>
+              </a:spcAft>
+              <a:buClr>
+                <a:schemeClr val="lt1"/>
+              </a:buClr>
+              <a:buSzPts val="3000"/>
+              <a:buFont typeface="Anek Devanagari"/>
+              <a:buNone/>
+              <a:defRPr sz="2500" b="1" i="0" u="none" strike="noStrike" cap="none">
+                <a:solidFill>
+                  <a:schemeClr val="lt1"/>
+                </a:solidFill>
+                <a:latin typeface="Anek Devanagari"/>
+                <a:ea typeface="Anek Devanagari"/>
+                <a:cs typeface="Anek Devanagari"/>
+                <a:sym typeface="Anek Devanagari"/>
+              </a:defRPr>
+            </a:lvl1pPr>
+            <a:lvl2pPr marR="0" lvl="1" algn="l" rtl="0">
+              <a:lnSpc>
+                <a:spcPct val="100000"/>
+              </a:lnSpc>
+              <a:spcBef>
+                <a:spcPts val="0"/>
+              </a:spcBef>
+              <a:spcAft>
+                <a:spcPts val="0"/>
+              </a:spcAft>
+              <a:buClr>
+                <a:schemeClr val="lt1"/>
+              </a:buClr>
+              <a:buSzPts val="3000"/>
+              <a:buFont typeface="Arial"/>
+              <a:buNone/>
+              <a:defRPr sz="3000" b="0" i="0" u="none" strike="noStrike" cap="none">
+                <a:solidFill>
+                  <a:schemeClr val="lt1"/>
+                </a:solidFill>
+                <a:latin typeface="Arial"/>
+                <a:ea typeface="Arial"/>
+                <a:cs typeface="Arial"/>
+                <a:sym typeface="Arial"/>
+              </a:defRPr>
+            </a:lvl2pPr>
+            <a:lvl3pPr marR="0" lvl="2" algn="l" rtl="0">
+              <a:lnSpc>
+                <a:spcPct val="100000"/>
+              </a:lnSpc>
+              <a:spcBef>
+                <a:spcPts val="0"/>
+              </a:spcBef>
+              <a:spcAft>
+                <a:spcPts val="0"/>
+              </a:spcAft>
+              <a:buClr>
+                <a:schemeClr val="lt1"/>
+              </a:buClr>
+              <a:buSzPts val="3000"/>
+              <a:buFont typeface="Arial"/>
+              <a:buNone/>
+              <a:defRPr sz="3000" b="0" i="0" u="none" strike="noStrike" cap="none">
+                <a:solidFill>
+                  <a:schemeClr val="lt1"/>
+                </a:solidFill>
+                <a:latin typeface="Arial"/>
+                <a:ea typeface="Arial"/>
+                <a:cs typeface="Arial"/>
+                <a:sym typeface="Arial"/>
+              </a:defRPr>
+            </a:lvl3pPr>
+            <a:lvl4pPr marR="0" lvl="3" algn="l" rtl="0">
+              <a:lnSpc>
+                <a:spcPct val="100000"/>
+              </a:lnSpc>
+              <a:spcBef>
+                <a:spcPts val="0"/>
+              </a:spcBef>
+              <a:spcAft>
+                <a:spcPts val="0"/>
+              </a:spcAft>
+              <a:buClr>
+                <a:schemeClr val="lt1"/>
+              </a:buClr>
+              <a:buSzPts val="3000"/>
+              <a:buFont typeface="Arial"/>
+              <a:buNone/>
+              <a:defRPr sz="3000" b="0" i="0" u="none" strike="noStrike" cap="none">
+                <a:solidFill>
+                  <a:schemeClr val="lt1"/>
+                </a:solidFill>
+                <a:latin typeface="Arial"/>
+                <a:ea typeface="Arial"/>
+                <a:cs typeface="Arial"/>
+                <a:sym typeface="Arial"/>
+              </a:defRPr>
+            </a:lvl4pPr>
+            <a:lvl5pPr marR="0" lvl="4" algn="l" rtl="0">
+              <a:lnSpc>
+                <a:spcPct val="100000"/>
+              </a:lnSpc>
+              <a:spcBef>
+                <a:spcPts val="0"/>
+              </a:spcBef>
+              <a:spcAft>
+                <a:spcPts val="0"/>
+              </a:spcAft>
+              <a:buClr>
+                <a:schemeClr val="lt1"/>
+              </a:buClr>
+              <a:buSzPts val="3000"/>
+              <a:buFont typeface="Arial"/>
+              <a:buNone/>
+              <a:defRPr sz="3000" b="0" i="0" u="none" strike="noStrike" cap="none">
+                <a:solidFill>
+                  <a:schemeClr val="lt1"/>
+                </a:solidFill>
+                <a:latin typeface="Arial"/>
+                <a:ea typeface="Arial"/>
+                <a:cs typeface="Arial"/>
+                <a:sym typeface="Arial"/>
+              </a:defRPr>
+            </a:lvl5pPr>
+            <a:lvl6pPr marR="0" lvl="5" algn="l" rtl="0">
+              <a:lnSpc>
+                <a:spcPct val="100000"/>
+              </a:lnSpc>
+              <a:spcBef>
+                <a:spcPts val="0"/>
+              </a:spcBef>
+              <a:spcAft>
+                <a:spcPts val="0"/>
+              </a:spcAft>
+              <a:buClr>
+                <a:schemeClr val="lt1"/>
+              </a:buClr>
+              <a:buSzPts val="3000"/>
+              <a:buFont typeface="Arial"/>
+              <a:buNone/>
+              <a:defRPr sz="3000" b="0" i="0" u="none" strike="noStrike" cap="none">
+                <a:solidFill>
+                  <a:schemeClr val="lt1"/>
+                </a:solidFill>
+                <a:latin typeface="Arial"/>
+                <a:ea typeface="Arial"/>
+                <a:cs typeface="Arial"/>
+                <a:sym typeface="Arial"/>
+              </a:defRPr>
+            </a:lvl6pPr>
+            <a:lvl7pPr marR="0" lvl="6" algn="l" rtl="0">
+              <a:lnSpc>
+                <a:spcPct val="100000"/>
+              </a:lnSpc>
+              <a:spcBef>
+                <a:spcPts val="0"/>
+              </a:spcBef>
+              <a:spcAft>
+                <a:spcPts val="0"/>
+              </a:spcAft>
+              <a:buClr>
+                <a:schemeClr val="lt1"/>
+              </a:buClr>
+              <a:buSzPts val="3000"/>
+              <a:buFont typeface="Arial"/>
+              <a:buNone/>
+              <a:defRPr sz="3000" b="0" i="0" u="none" strike="noStrike" cap="none">
+                <a:solidFill>
+                  <a:schemeClr val="lt1"/>
+                </a:solidFill>
+                <a:latin typeface="Arial"/>
+                <a:ea typeface="Arial"/>
+                <a:cs typeface="Arial"/>
+                <a:sym typeface="Arial"/>
+              </a:defRPr>
+            </a:lvl7pPr>
+            <a:lvl8pPr marR="0" lvl="7" algn="l" rtl="0">
+              <a:lnSpc>
+                <a:spcPct val="100000"/>
+              </a:lnSpc>
+              <a:spcBef>
+                <a:spcPts val="0"/>
+              </a:spcBef>
+              <a:spcAft>
+                <a:spcPts val="0"/>
+              </a:spcAft>
+              <a:buClr>
+                <a:schemeClr val="lt1"/>
+              </a:buClr>
+              <a:buSzPts val="3000"/>
+              <a:buFont typeface="Arial"/>
+              <a:buNone/>
+              <a:defRPr sz="3000" b="0" i="0" u="none" strike="noStrike" cap="none">
+                <a:solidFill>
+                  <a:schemeClr val="lt1"/>
+                </a:solidFill>
+                <a:latin typeface="Arial"/>
+                <a:ea typeface="Arial"/>
+                <a:cs typeface="Arial"/>
+                <a:sym typeface="Arial"/>
+              </a:defRPr>
+            </a:lvl8pPr>
+            <a:lvl9pPr marR="0" lvl="8" algn="l" rtl="0">
+              <a:lnSpc>
+                <a:spcPct val="100000"/>
+              </a:lnSpc>
+              <a:spcBef>
+                <a:spcPts val="0"/>
+              </a:spcBef>
+              <a:spcAft>
+                <a:spcPts val="0"/>
+              </a:spcAft>
+              <a:buClr>
+                <a:schemeClr val="lt1"/>
+              </a:buClr>
+              <a:buSzPts val="3000"/>
+              <a:buFont typeface="Arial"/>
+              <a:buNone/>
+              <a:defRPr sz="3000" b="0" i="0" u="none" strike="noStrike" cap="none">
+                <a:solidFill>
+                  <a:schemeClr val="lt1"/>
+                </a:solidFill>
+                <a:latin typeface="Arial"/>
+                <a:ea typeface="Arial"/>
+                <a:cs typeface="Arial"/>
+                <a:sym typeface="Arial"/>
+              </a:defRPr>
+            </a:lvl9pPr>
+          </a:lstStyle>
+          <a:p>
+            <a:r>
+              <a:rPr lang="en" dirty="0"/>
+              <a:t>5</a:t>
+            </a:r>
+          </a:p>
+        </p:txBody>
+      </p:sp>
+      <p:sp>
+        <p:nvSpPr>
+          <p:cNvPr id="12" name="Google Shape;269;p34">
+            <a:extLst>
+              <a:ext uri="{FF2B5EF4-FFF2-40B4-BE49-F238E27FC236}">
+                <a16:creationId xmlns:a16="http://schemas.microsoft.com/office/drawing/2014/main" id="{8319F128-4E47-C2B7-D32B-C40F11DB297C}"/>
+              </a:ext>
+            </a:extLst>
+          </p:cNvPr>
+          <p:cNvSpPr txBox="1">
+            <a:spLocks/>
+          </p:cNvSpPr>
+          <p:nvPr/>
+        </p:nvSpPr>
+        <p:spPr>
+          <a:xfrm flipH="1">
+            <a:off x="4329598" y="4012348"/>
+            <a:ext cx="2869800" cy="365700"/>
+          </a:xfrm>
+          <a:prstGeom prst="rect">
+            <a:avLst/>
+          </a:prstGeom>
+          <a:noFill/>
+          <a:ln>
+            <a:noFill/>
+          </a:ln>
+        </p:spPr>
+        <p:txBody>
+          <a:bodyPr spcFirstLastPara="1" wrap="square" lIns="91425" tIns="91425" rIns="91425" bIns="91425" anchor="b" anchorCtr="0">
+            <a:noAutofit/>
+          </a:bodyPr>
+          <a:lstStyle>
+            <a:defPPr marR="0" lvl="0" algn="l" rtl="0">
+              <a:lnSpc>
+                <a:spcPct val="100000"/>
+              </a:lnSpc>
+              <a:spcBef>
+                <a:spcPts val="0"/>
+              </a:spcBef>
+              <a:spcAft>
+                <a:spcPts val="0"/>
+              </a:spcAft>
+            </a:defPPr>
+            <a:lvl1pPr marR="0" lvl="0" algn="ctr" rtl="0">
+              <a:lnSpc>
+                <a:spcPct val="100000"/>
+              </a:lnSpc>
+              <a:spcBef>
+                <a:spcPts val="0"/>
+              </a:spcBef>
+              <a:spcAft>
+                <a:spcPts val="0"/>
+              </a:spcAft>
+              <a:buClr>
+                <a:schemeClr val="lt1"/>
+              </a:buClr>
+              <a:buSzPts val="2500"/>
+              <a:buFont typeface="Anek Devanagari"/>
+              <a:buNone/>
+              <a:defRPr sz="2200" b="1" i="0" u="none" strike="noStrike" cap="none">
+                <a:solidFill>
+                  <a:schemeClr val="lt1"/>
+                </a:solidFill>
+                <a:latin typeface="Anek Devanagari"/>
+                <a:ea typeface="Anek Devanagari"/>
+                <a:cs typeface="Anek Devanagari"/>
+                <a:sym typeface="Anek Devanagari"/>
+              </a:defRPr>
+            </a:lvl1pPr>
+            <a:lvl2pPr marR="0" lvl="1" algn="ctr" rtl="0">
+              <a:lnSpc>
+                <a:spcPct val="100000"/>
+              </a:lnSpc>
+              <a:spcBef>
+                <a:spcPts val="0"/>
+              </a:spcBef>
+              <a:spcAft>
+                <a:spcPts val="0"/>
+              </a:spcAft>
+              <a:buClr>
+                <a:schemeClr val="lt1"/>
+              </a:buClr>
+              <a:buSzPts val="2500"/>
+              <a:buFont typeface="Arial"/>
+              <a:buNone/>
+              <a:defRPr sz="2500" b="0" i="0" u="none" strike="noStrike" cap="none">
+                <a:solidFill>
+                  <a:schemeClr val="lt1"/>
+                </a:solidFill>
+                <a:latin typeface="Arial"/>
+                <a:ea typeface="Arial"/>
+                <a:cs typeface="Arial"/>
+                <a:sym typeface="Arial"/>
+              </a:defRPr>
+            </a:lvl2pPr>
+            <a:lvl3pPr marR="0" lvl="2" algn="ctr" rtl="0">
+              <a:lnSpc>
+                <a:spcPct val="100000"/>
+              </a:lnSpc>
+              <a:spcBef>
+                <a:spcPts val="0"/>
+              </a:spcBef>
+              <a:spcAft>
+                <a:spcPts val="0"/>
+              </a:spcAft>
+              <a:buClr>
+                <a:schemeClr val="lt1"/>
+              </a:buClr>
+              <a:buSzPts val="2500"/>
+              <a:buFont typeface="Arial"/>
+              <a:buNone/>
+              <a:defRPr sz="2500" b="0" i="0" u="none" strike="noStrike" cap="none">
+                <a:solidFill>
+                  <a:schemeClr val="lt1"/>
+                </a:solidFill>
+                <a:latin typeface="Arial"/>
+                <a:ea typeface="Arial"/>
+                <a:cs typeface="Arial"/>
+                <a:sym typeface="Arial"/>
+              </a:defRPr>
+            </a:lvl3pPr>
+            <a:lvl4pPr marR="0" lvl="3" algn="ctr" rtl="0">
+              <a:lnSpc>
+                <a:spcPct val="100000"/>
+              </a:lnSpc>
+              <a:spcBef>
+                <a:spcPts val="0"/>
+              </a:spcBef>
+              <a:spcAft>
+                <a:spcPts val="0"/>
+              </a:spcAft>
+              <a:buClr>
+                <a:schemeClr val="lt1"/>
+              </a:buClr>
+              <a:buSzPts val="2500"/>
+              <a:buFont typeface="Arial"/>
+              <a:buNone/>
+              <a:defRPr sz="2500" b="0" i="0" u="none" strike="noStrike" cap="none">
+                <a:solidFill>
+                  <a:schemeClr val="lt1"/>
+                </a:solidFill>
+                <a:latin typeface="Arial"/>
+                <a:ea typeface="Arial"/>
+                <a:cs typeface="Arial"/>
+                <a:sym typeface="Arial"/>
+              </a:defRPr>
+            </a:lvl4pPr>
+            <a:lvl5pPr marR="0" lvl="4" algn="ctr" rtl="0">
+              <a:lnSpc>
+                <a:spcPct val="100000"/>
+              </a:lnSpc>
+              <a:spcBef>
+                <a:spcPts val="0"/>
+              </a:spcBef>
+              <a:spcAft>
+                <a:spcPts val="0"/>
+              </a:spcAft>
+              <a:buClr>
+                <a:schemeClr val="lt1"/>
+              </a:buClr>
+              <a:buSzPts val="2500"/>
+              <a:buFont typeface="Arial"/>
+              <a:buNone/>
+              <a:defRPr sz="2500" b="0" i="0" u="none" strike="noStrike" cap="none">
+                <a:solidFill>
+                  <a:schemeClr val="lt1"/>
+                </a:solidFill>
+                <a:latin typeface="Arial"/>
+                <a:ea typeface="Arial"/>
+                <a:cs typeface="Arial"/>
+                <a:sym typeface="Arial"/>
+              </a:defRPr>
+            </a:lvl5pPr>
+            <a:lvl6pPr marR="0" lvl="5" algn="ctr" rtl="0">
+              <a:lnSpc>
+                <a:spcPct val="100000"/>
+              </a:lnSpc>
+              <a:spcBef>
+                <a:spcPts val="0"/>
+              </a:spcBef>
+              <a:spcAft>
+                <a:spcPts val="0"/>
+              </a:spcAft>
+              <a:buClr>
+                <a:schemeClr val="lt1"/>
+              </a:buClr>
+              <a:buSzPts val="2500"/>
+              <a:buFont typeface="Arial"/>
+              <a:buNone/>
+              <a:defRPr sz="2500" b="0" i="0" u="none" strike="noStrike" cap="none">
+                <a:solidFill>
+                  <a:schemeClr val="lt1"/>
+                </a:solidFill>
+                <a:latin typeface="Arial"/>
+                <a:ea typeface="Arial"/>
+                <a:cs typeface="Arial"/>
+                <a:sym typeface="Arial"/>
+              </a:defRPr>
+            </a:lvl6pPr>
+            <a:lvl7pPr marR="0" lvl="6" algn="ctr" rtl="0">
+              <a:lnSpc>
+                <a:spcPct val="100000"/>
+              </a:lnSpc>
+              <a:spcBef>
+                <a:spcPts val="0"/>
+              </a:spcBef>
+              <a:spcAft>
+                <a:spcPts val="0"/>
+              </a:spcAft>
+              <a:buClr>
+                <a:schemeClr val="lt1"/>
+              </a:buClr>
+              <a:buSzPts val="2500"/>
+              <a:buFont typeface="Arial"/>
+              <a:buNone/>
+              <a:defRPr sz="2500" b="0" i="0" u="none" strike="noStrike" cap="none">
+                <a:solidFill>
+                  <a:schemeClr val="lt1"/>
+                </a:solidFill>
+                <a:latin typeface="Arial"/>
+                <a:ea typeface="Arial"/>
+                <a:cs typeface="Arial"/>
+                <a:sym typeface="Arial"/>
+              </a:defRPr>
+            </a:lvl7pPr>
+            <a:lvl8pPr marR="0" lvl="7" algn="ctr" rtl="0">
+              <a:lnSpc>
+                <a:spcPct val="100000"/>
+              </a:lnSpc>
+              <a:spcBef>
+                <a:spcPts val="0"/>
+              </a:spcBef>
+              <a:spcAft>
+                <a:spcPts val="0"/>
+              </a:spcAft>
+              <a:buClr>
+                <a:schemeClr val="lt1"/>
+              </a:buClr>
+              <a:buSzPts val="2500"/>
+              <a:buFont typeface="Arial"/>
+              <a:buNone/>
+              <a:defRPr sz="2500" b="0" i="0" u="none" strike="noStrike" cap="none">
+                <a:solidFill>
+                  <a:schemeClr val="lt1"/>
+                </a:solidFill>
+                <a:latin typeface="Arial"/>
+                <a:ea typeface="Arial"/>
+                <a:cs typeface="Arial"/>
+                <a:sym typeface="Arial"/>
+              </a:defRPr>
+            </a:lvl8pPr>
+            <a:lvl9pPr marR="0" lvl="8" algn="ctr" rtl="0">
+              <a:lnSpc>
+                <a:spcPct val="100000"/>
+              </a:lnSpc>
+              <a:spcBef>
+                <a:spcPts val="0"/>
+              </a:spcBef>
+              <a:spcAft>
+                <a:spcPts val="0"/>
+              </a:spcAft>
+              <a:buClr>
+                <a:schemeClr val="lt1"/>
+              </a:buClr>
+              <a:buSzPts val="2500"/>
+              <a:buFont typeface="Arial"/>
+              <a:buNone/>
+              <a:defRPr sz="2500" b="0" i="0" u="none" strike="noStrike" cap="none">
+                <a:solidFill>
+                  <a:schemeClr val="lt1"/>
+                </a:solidFill>
+                <a:latin typeface="Arial"/>
+                <a:ea typeface="Arial"/>
+                <a:cs typeface="Arial"/>
+                <a:sym typeface="Arial"/>
+              </a:defRPr>
+            </a:lvl9pPr>
+          </a:lstStyle>
+          <a:p>
+            <a:r>
+              <a:rPr lang="en-US" dirty="0"/>
+              <a:t>Artificial Intelligence</a:t>
+            </a:r>
           </a:p>
         </p:txBody>
       </p:sp>
@@ -8555,8 +9142,8 @@
               <a:buNone/>
             </a:pPr>
             <a:r>
-              <a:rPr lang="en" dirty="0"/>
-              <a:t>You can give a brief description of the topic you want to talk about here. For example, if you want to talk about Mercury, you can say that it’s the smallest planet in the entire Solar System</a:t>
+              <a:rPr lang="en-US" dirty="0"/>
+              <a:t>Academic integrity represents the core of Grand Canyon University's (GCU) values and is essential to the educational community's success. Each academic policy is shaped by our fundamental values of honesty, trust, fairness, respect and responsibility.</a:t>
             </a:r>
             <a:endParaRPr dirty="0"/>
           </a:p>
@@ -9001,8 +9588,8 @@
               <a:buNone/>
             </a:pPr>
             <a:r>
-              <a:rPr lang="en" dirty="0"/>
-              <a:t>You can give a brief description of the topic you want to talk about here. For example, if you want to talk about Mercury, you can say that it’s the smallest planet in the entire Solar System</a:t>
+              <a:rPr lang="en-US" dirty="0"/>
+              <a:t>At the graduate level, the close study of your chosen subject discipline intensifies. You will begin both an in-depth, structured exploration and an independent exploration of subjects and resources. Familiarity with library databases, organization and documentation of research and ideas, along with efficient digital literacy skills are all requirements for successful academic research.</a:t>
             </a:r>
             <a:endParaRPr dirty="0"/>
           </a:p>
@@ -9453,7 +10040,7 @@
             </a:pPr>
             <a:r>
               <a:rPr lang="en" dirty="0"/>
-              <a:t>You can give a brief description of the topic you want to talk about here. For example, if you want to talk about Mercury, you can say that it’s the smallest planet in the entire Solar System</a:t>
+              <a:t>Goes hand in hand with Academic Integrity because as Christians we need to be trustworthy, respectful, honest, and responsible in every aspect of life.</a:t>
             </a:r>
             <a:endParaRPr dirty="0"/>
           </a:p>
@@ -9904,7 +10491,55 @@
             </a:pPr>
             <a:r>
               <a:rPr lang="en" dirty="0"/>
-              <a:t>You can give a brief description of the topic you want to talk about here. For example, if you want to talk about Mercury, you can say that it’s the smallest planet in the entire Solar System</a:t>
+              <a:t>Grand Canyon Universities example of Academic Dishonesty include:</a:t>
+            </a:r>
+          </a:p>
+          <a:p>
+            <a:pPr marL="285750" lvl="0" indent="-285750" algn="ctr" rtl="0">
+              <a:spcBef>
+                <a:spcPts val="0"/>
+              </a:spcBef>
+              <a:spcAft>
+                <a:spcPts val="0"/>
+              </a:spcAft>
+              <a:buFont typeface="Arial" panose="020B0604020202020204" pitchFamily="34" charset="0"/>
+              <a:buChar char="•"/>
+            </a:pPr>
+            <a:r>
+              <a:rPr lang="en" dirty="0"/>
+              <a:t>Plagarism</a:t>
+            </a:r>
+          </a:p>
+          <a:p>
+            <a:pPr marL="285750" lvl="0" indent="-285750" algn="ctr" rtl="0">
+              <a:spcBef>
+                <a:spcPts val="0"/>
+              </a:spcBef>
+              <a:spcAft>
+                <a:spcPts val="0"/>
+              </a:spcAft>
+              <a:buFont typeface="Arial" panose="020B0604020202020204" pitchFamily="34" charset="0"/>
+              <a:buChar char="•"/>
+            </a:pPr>
+            <a:r>
+              <a:rPr lang="en" dirty="0"/>
+              <a:t>Unsanctioned Collaboration</a:t>
+            </a:r>
+          </a:p>
+          <a:p>
+            <a:pPr marL="285750" lvl="0" indent="-285750" algn="ctr" rtl="0">
+              <a:spcBef>
+                <a:spcPts val="0"/>
+              </a:spcBef>
+              <a:spcAft>
+                <a:spcPts val="0"/>
+              </a:spcAft>
+              <a:buFont typeface="Arial" panose="020B0604020202020204" pitchFamily="34" charset="0"/>
+              <a:buChar char="•"/>
+            </a:pPr>
+            <a:r>
+              <a:rPr lang="en" dirty="0"/>
+              <a:t>Selling or sharing your work</a:t>
             </a:r>
             <a:endParaRPr dirty="0"/>
           </a:p>
@@ -10355,7 +10990,7 @@
             </a:pPr>
             <a:r>
               <a:rPr lang="en" dirty="0"/>
-              <a:t>You can give a brief description of the topic you want to talk about here. For example, if you want to talk about Mercury, you can say that it’s the smallest planet in the entire Solar System</a:t>
+              <a:t>Is a tool that has its place in certain settings. Using AI to help with assignments is a form of Academic Dishonesty and defeats the purpose of attending Graduate school.</a:t>
             </a:r>
             <a:endParaRPr dirty="0"/>
           </a:p>
@@ -10819,6 +11454,269 @@
         </p:txBody>
       </p:sp>
     </p:spTree>
+  </p:cSld>
+  <p:clrMapOvr>
+    <a:masterClrMapping/>
+  </p:clrMapOvr>
+</p:sld>
+</file>
+
+<file path=ppt/slides/slide9.xml><?xml version="1.0" encoding="utf-8"?>
+<p:sld xmlns:a="http://schemas.openxmlformats.org/drawingml/2006/main" xmlns:r="http://schemas.openxmlformats.org/officeDocument/2006/relationships" xmlns:p="http://schemas.openxmlformats.org/presentationml/2006/main">
+  <p:cSld>
+    <p:spTree>
+      <p:nvGrpSpPr>
+        <p:cNvPr id="1" name="Shape 417"/>
+        <p:cNvGrpSpPr/>
+        <p:nvPr/>
+      </p:nvGrpSpPr>
+      <p:grpSpPr>
+        <a:xfrm>
+          <a:off x="0" y="0"/>
+          <a:ext cx="0" cy="0"/>
+          <a:chOff x="0" y="0"/>
+          <a:chExt cx="0" cy="0"/>
+        </a:xfrm>
+      </p:grpSpPr>
+      <p:sp>
+        <p:nvSpPr>
+          <p:cNvPr id="418" name="Google Shape;418;p42"/>
+          <p:cNvSpPr txBox="1">
+            <a:spLocks noGrp="1"/>
+          </p:cNvSpPr>
+          <p:nvPr>
+            <p:ph type="title"/>
+          </p:nvPr>
+        </p:nvSpPr>
+        <p:spPr>
+          <a:xfrm>
+            <a:off x="82809" y="488199"/>
+            <a:ext cx="7714500" cy="548700"/>
+          </a:xfrm>
+          <a:prstGeom prst="rect">
+            <a:avLst/>
+          </a:prstGeom>
+        </p:spPr>
+        <p:txBody>
+          <a:bodyPr spcFirstLastPara="1" wrap="square" lIns="731500" tIns="91425" rIns="731500" bIns="91425" anchor="t" anchorCtr="0">
+            <a:noAutofit/>
+          </a:bodyPr>
+          <a:lstStyle/>
+          <a:p>
+            <a:pPr marL="0" lvl="0" indent="0" algn="ctr" rtl="0">
+              <a:spcBef>
+                <a:spcPts val="0"/>
+              </a:spcBef>
+              <a:spcAft>
+                <a:spcPts val="0"/>
+              </a:spcAft>
+              <a:buNone/>
+            </a:pPr>
+            <a:r>
+              <a:rPr lang="en" dirty="0"/>
+              <a:t>References:</a:t>
+            </a:r>
+            <a:endParaRPr dirty="0"/>
+          </a:p>
+        </p:txBody>
+      </p:sp>
+      <p:sp>
+        <p:nvSpPr>
+          <p:cNvPr id="419" name="Google Shape;419;p42"/>
+          <p:cNvSpPr txBox="1">
+            <a:spLocks noGrp="1"/>
+          </p:cNvSpPr>
+          <p:nvPr>
+            <p:ph type="subTitle" idx="1"/>
+          </p:nvPr>
+        </p:nvSpPr>
+        <p:spPr>
+          <a:xfrm>
+            <a:off x="714750" y="1411287"/>
+            <a:ext cx="7714500" cy="1767300"/>
+          </a:xfrm>
+          <a:prstGeom prst="rect">
+            <a:avLst/>
+          </a:prstGeom>
+        </p:spPr>
+        <p:txBody>
+          <a:bodyPr spcFirstLastPara="1" wrap="square" lIns="91425" tIns="91425" rIns="91425" bIns="91425" anchor="b" anchorCtr="0">
+            <a:noAutofit/>
+          </a:bodyPr>
+          <a:lstStyle/>
+          <a:p>
+            <a:pPr marL="457200" marR="0" indent="-457200">
+              <a:lnSpc>
+                <a:spcPct val="200000"/>
+              </a:lnSpc>
+              <a:spcBef>
+                <a:spcPts val="0"/>
+              </a:spcBef>
+              <a:spcAft>
+                <a:spcPts val="0"/>
+              </a:spcAft>
+            </a:pPr>
+            <a:r>
+              <a:rPr lang="en-US" sz="1000" dirty="0" err="1">
+                <a:effectLst/>
+                <a:latin typeface="Times New Roman" panose="02020603050405020304" pitchFamily="18" charset="0"/>
+                <a:ea typeface="Times New Roman" panose="02020603050405020304" pitchFamily="18" charset="0"/>
+              </a:rPr>
+              <a:t>BibleStudyTools</a:t>
+            </a:r>
+            <a:r>
+              <a:rPr lang="en-US" sz="1000" dirty="0">
+                <a:effectLst/>
+                <a:latin typeface="Times New Roman" panose="02020603050405020304" pitchFamily="18" charset="0"/>
+                <a:ea typeface="Times New Roman" panose="02020603050405020304" pitchFamily="18" charset="0"/>
+              </a:rPr>
+              <a:t> Staff. (n.d.). </a:t>
+            </a:r>
+            <a:r>
+              <a:rPr lang="en-US" sz="1000" i="1" dirty="0">
+                <a:effectLst/>
+                <a:latin typeface="Times New Roman" panose="02020603050405020304" pitchFamily="18" charset="0"/>
+                <a:ea typeface="Times New Roman" panose="02020603050405020304" pitchFamily="18" charset="0"/>
+              </a:rPr>
+              <a:t>1 Chronicles 29:17</a:t>
+            </a:r>
+            <a:r>
+              <a:rPr lang="en-US" sz="1000" dirty="0">
+                <a:effectLst/>
+                <a:latin typeface="Times New Roman" panose="02020603050405020304" pitchFamily="18" charset="0"/>
+                <a:ea typeface="Times New Roman" panose="02020603050405020304" pitchFamily="18" charset="0"/>
+              </a:rPr>
+              <a:t>. Bible Study Tools. https://www.biblestudytools.com/1-chronicles/29-17.html#:~:text=17%20I%20know%2C%20my%20God,here%20have%20given%20to%20you.</a:t>
+            </a:r>
+          </a:p>
+          <a:p>
+            <a:pPr marL="457200" marR="0" indent="-457200">
+              <a:lnSpc>
+                <a:spcPct val="200000"/>
+              </a:lnSpc>
+            </a:pPr>
+            <a:r>
+              <a:rPr lang="en-US" sz="1000" dirty="0">
+                <a:effectLst/>
+                <a:latin typeface="Times New Roman" panose="02020603050405020304" pitchFamily="18" charset="0"/>
+                <a:ea typeface="Times New Roman" panose="02020603050405020304" pitchFamily="18" charset="0"/>
+              </a:rPr>
+              <a:t>DiVincenzo, A. (Ed.). (2014). </a:t>
+            </a:r>
+            <a:r>
+              <a:rPr lang="en-US" sz="1000" i="1" dirty="0">
+                <a:effectLst/>
+                <a:latin typeface="Times New Roman" panose="02020603050405020304" pitchFamily="18" charset="0"/>
+                <a:ea typeface="Times New Roman" panose="02020603050405020304" pitchFamily="18" charset="0"/>
+              </a:rPr>
+              <a:t>Mastering graduate studies</a:t>
+            </a:r>
+            <a:r>
+              <a:rPr lang="en-US" sz="1000" dirty="0">
+                <a:effectLst/>
+                <a:latin typeface="Times New Roman" panose="02020603050405020304" pitchFamily="18" charset="0"/>
+                <a:ea typeface="Times New Roman" panose="02020603050405020304" pitchFamily="18" charset="0"/>
+              </a:rPr>
+              <a:t>. Grand Canyon University. ISBN gcu_0000000000005</a:t>
+            </a:r>
+          </a:p>
+          <a:p>
+            <a:pPr marL="457200" marR="0" indent="-457200">
+              <a:lnSpc>
+                <a:spcPct val="200000"/>
+              </a:lnSpc>
+              <a:spcBef>
+                <a:spcPts val="0"/>
+              </a:spcBef>
+              <a:spcAft>
+                <a:spcPts val="0"/>
+              </a:spcAft>
+            </a:pPr>
+            <a:r>
+              <a:rPr lang="en-US" sz="1000" dirty="0">
+                <a:effectLst/>
+                <a:latin typeface="Times New Roman" panose="02020603050405020304" pitchFamily="18" charset="0"/>
+                <a:ea typeface="Times New Roman" panose="02020603050405020304" pitchFamily="18" charset="0"/>
+              </a:rPr>
+              <a:t>Grand Canyon University. “Academic Integrity.” </a:t>
+            </a:r>
+            <a:r>
+              <a:rPr lang="en-US" sz="1000" i="1" dirty="0">
+                <a:effectLst/>
+                <a:latin typeface="Times New Roman" panose="02020603050405020304" pitchFamily="18" charset="0"/>
+                <a:ea typeface="Times New Roman" panose="02020603050405020304" pitchFamily="18" charset="0"/>
+              </a:rPr>
+              <a:t>Grand Canyon University</a:t>
+            </a:r>
+            <a:r>
+              <a:rPr lang="en-US" sz="1000" dirty="0">
+                <a:effectLst/>
+                <a:latin typeface="Times New Roman" panose="02020603050405020304" pitchFamily="18" charset="0"/>
+                <a:ea typeface="Times New Roman" panose="02020603050405020304" pitchFamily="18" charset="0"/>
+              </a:rPr>
+              <a:t>, 2019, students.gcu.edu/academics/academic-</a:t>
+            </a:r>
+            <a:r>
+              <a:rPr lang="en-US" sz="1000" dirty="0" err="1">
+                <a:effectLst/>
+                <a:latin typeface="Times New Roman" panose="02020603050405020304" pitchFamily="18" charset="0"/>
+                <a:ea typeface="Times New Roman" panose="02020603050405020304" pitchFamily="18" charset="0"/>
+              </a:rPr>
+              <a:t>integrity.php</a:t>
+            </a:r>
+            <a:r>
+              <a:rPr lang="en-US" sz="1000" dirty="0">
+                <a:effectLst/>
+                <a:latin typeface="Times New Roman" panose="02020603050405020304" pitchFamily="18" charset="0"/>
+                <a:ea typeface="Times New Roman" panose="02020603050405020304" pitchFamily="18" charset="0"/>
+              </a:rPr>
+              <a:t>.</a:t>
+            </a:r>
+          </a:p>
+          <a:p>
+            <a:pPr marL="0" lvl="0" indent="0" algn="ctr" rtl="0">
+              <a:spcBef>
+                <a:spcPts val="0"/>
+              </a:spcBef>
+              <a:spcAft>
+                <a:spcPts val="0"/>
+              </a:spcAft>
+              <a:buNone/>
+            </a:pPr>
+            <a:endParaRPr lang="en-US" sz="1000" b="0" i="0" dirty="0">
+              <a:solidFill>
+                <a:srgbClr val="212121"/>
+              </a:solidFill>
+              <a:effectLst/>
+              <a:highlight>
+                <a:srgbClr val="FFFFFF"/>
+              </a:highlight>
+              <a:latin typeface="Open Sans" panose="020B0606030504020204" pitchFamily="34" charset="0"/>
+            </a:endParaRPr>
+          </a:p>
+          <a:p>
+            <a:pPr marL="0" lvl="0" indent="0" algn="ctr" rtl="0">
+              <a:spcBef>
+                <a:spcPts val="0"/>
+              </a:spcBef>
+              <a:spcAft>
+                <a:spcPts val="0"/>
+              </a:spcAft>
+              <a:buNone/>
+            </a:pPr>
+            <a:endParaRPr sz="1000" dirty="0">
+              <a:latin typeface="Anek Devanagari" panose="020B0604020202020204" charset="0"/>
+              <a:cs typeface="Anek Devanagari" panose="020B0604020202020204" charset="0"/>
+            </a:endParaRPr>
+          </a:p>
+        </p:txBody>
+      </p:sp>
+    </p:spTree>
+    <p:extLst>
+      <p:ext uri="{BB962C8B-B14F-4D97-AF65-F5344CB8AC3E}">
+        <p14:creationId xmlns:p14="http://schemas.microsoft.com/office/powerpoint/2010/main" val="1921912470"/>
+      </p:ext>
+    </p:extLst>
   </p:cSld>
   <p:clrMapOvr>
     <a:masterClrMapping/>

</xml_diff>